<commit_message>
decoupling changeset from featurecommit class
</commit_message>
<xml_diff>
--- a/project/Mining Git.pptx
+++ b/project/Mining Git.pptx
@@ -13,8 +13,10 @@
     <p:sldId id="261" r:id="rId7"/>
     <p:sldId id="262" r:id="rId8"/>
     <p:sldId id="263" r:id="rId9"/>
-    <p:sldId id="257" r:id="rId10"/>
-    <p:sldId id="264" r:id="rId11"/>
+    <p:sldId id="266" r:id="rId10"/>
+    <p:sldId id="267" r:id="rId11"/>
+    <p:sldId id="257" r:id="rId12"/>
+    <p:sldId id="264" r:id="rId13"/>
   </p:sldIdLst>
   <p:sldSz cx="9144000" cy="6858000" type="screen4x3"/>
   <p:notesSz cx="6858000" cy="9144000"/>
@@ -297,7 +299,7 @@
           <a:p>
             <a:fld id="{E06ED853-94C4-4CD4-BAC0-E9D782A6748D}" type="datetimeFigureOut">
               <a:rPr lang="en-US" smtClean="0"/>
-              <a:t>11/23/2012</a:t>
+              <a:t>2/6/2013</a:t>
             </a:fld>
             <a:endParaRPr lang="en-US"/>
           </a:p>
@@ -467,7 +469,7 @@
           <a:p>
             <a:fld id="{E06ED853-94C4-4CD4-BAC0-E9D782A6748D}" type="datetimeFigureOut">
               <a:rPr lang="en-US" smtClean="0"/>
-              <a:t>11/23/2012</a:t>
+              <a:t>2/6/2013</a:t>
             </a:fld>
             <a:endParaRPr lang="en-US"/>
           </a:p>
@@ -647,7 +649,7 @@
           <a:p>
             <a:fld id="{E06ED853-94C4-4CD4-BAC0-E9D782A6748D}" type="datetimeFigureOut">
               <a:rPr lang="en-US" smtClean="0"/>
-              <a:t>11/23/2012</a:t>
+              <a:t>2/6/2013</a:t>
             </a:fld>
             <a:endParaRPr lang="en-US"/>
           </a:p>
@@ -817,7 +819,7 @@
           <a:p>
             <a:fld id="{E06ED853-94C4-4CD4-BAC0-E9D782A6748D}" type="datetimeFigureOut">
               <a:rPr lang="en-US" smtClean="0"/>
-              <a:t>11/23/2012</a:t>
+              <a:t>2/6/2013</a:t>
             </a:fld>
             <a:endParaRPr lang="en-US"/>
           </a:p>
@@ -1063,7 +1065,7 @@
           <a:p>
             <a:fld id="{E06ED853-94C4-4CD4-BAC0-E9D782A6748D}" type="datetimeFigureOut">
               <a:rPr lang="en-US" smtClean="0"/>
-              <a:t>11/23/2012</a:t>
+              <a:t>2/6/2013</a:t>
             </a:fld>
             <a:endParaRPr lang="en-US"/>
           </a:p>
@@ -1351,7 +1353,7 @@
           <a:p>
             <a:fld id="{E06ED853-94C4-4CD4-BAC0-E9D782A6748D}" type="datetimeFigureOut">
               <a:rPr lang="en-US" smtClean="0"/>
-              <a:t>11/23/2012</a:t>
+              <a:t>2/6/2013</a:t>
             </a:fld>
             <a:endParaRPr lang="en-US"/>
           </a:p>
@@ -1773,7 +1775,7 @@
           <a:p>
             <a:fld id="{E06ED853-94C4-4CD4-BAC0-E9D782A6748D}" type="datetimeFigureOut">
               <a:rPr lang="en-US" smtClean="0"/>
-              <a:t>11/23/2012</a:t>
+              <a:t>2/6/2013</a:t>
             </a:fld>
             <a:endParaRPr lang="en-US"/>
           </a:p>
@@ -1891,7 +1893,7 @@
           <a:p>
             <a:fld id="{E06ED853-94C4-4CD4-BAC0-E9D782A6748D}" type="datetimeFigureOut">
               <a:rPr lang="en-US" smtClean="0"/>
-              <a:t>11/23/2012</a:t>
+              <a:t>2/6/2013</a:t>
             </a:fld>
             <a:endParaRPr lang="en-US"/>
           </a:p>
@@ -1986,7 +1988,7 @@
           <a:p>
             <a:fld id="{E06ED853-94C4-4CD4-BAC0-E9D782A6748D}" type="datetimeFigureOut">
               <a:rPr lang="en-US" smtClean="0"/>
-              <a:t>11/23/2012</a:t>
+              <a:t>2/6/2013</a:t>
             </a:fld>
             <a:endParaRPr lang="en-US"/>
           </a:p>
@@ -2263,7 +2265,7 @@
           <a:p>
             <a:fld id="{E06ED853-94C4-4CD4-BAC0-E9D782A6748D}" type="datetimeFigureOut">
               <a:rPr lang="en-US" smtClean="0"/>
-              <a:t>11/23/2012</a:t>
+              <a:t>2/6/2013</a:t>
             </a:fld>
             <a:endParaRPr lang="en-US"/>
           </a:p>
@@ -2516,7 +2518,7 @@
           <a:p>
             <a:fld id="{E06ED853-94C4-4CD4-BAC0-E9D782A6748D}" type="datetimeFigureOut">
               <a:rPr lang="en-US" smtClean="0"/>
-              <a:t>11/23/2012</a:t>
+              <a:t>2/6/2013</a:t>
             </a:fld>
             <a:endParaRPr lang="en-US"/>
           </a:p>
@@ -2729,7 +2731,7 @@
           <a:p>
             <a:fld id="{E06ED853-94C4-4CD4-BAC0-E9D782A6748D}" type="datetimeFigureOut">
               <a:rPr lang="en-US" smtClean="0"/>
-              <a:t>11/23/2012</a:t>
+              <a:t>2/6/2013</a:t>
             </a:fld>
             <a:endParaRPr lang="en-US"/>
           </a:p>
@@ -3172,6 +3174,393 @@
 </file>
 
 <file path=ppt/slides/slide10.xml><?xml version="1.0" encoding="utf-8"?>
+<p:sld xmlns:a="http://schemas.openxmlformats.org/drawingml/2006/main" xmlns:r="http://schemas.openxmlformats.org/officeDocument/2006/relationships" xmlns:p="http://schemas.openxmlformats.org/presentationml/2006/main">
+  <p:cSld>
+    <p:spTree>
+      <p:nvGrpSpPr>
+        <p:cNvPr id="1" name=""/>
+        <p:cNvGrpSpPr/>
+        <p:nvPr/>
+      </p:nvGrpSpPr>
+      <p:grpSpPr>
+        <a:xfrm>
+          <a:off x="0" y="0"/>
+          <a:ext cx="0" cy="0"/>
+          <a:chOff x="0" y="0"/>
+          <a:chExt cx="0" cy="0"/>
+        </a:xfrm>
+      </p:grpSpPr>
+      <p:sp>
+        <p:nvSpPr>
+          <p:cNvPr id="2" name="Título 1"/>
+          <p:cNvSpPr>
+            <a:spLocks noGrp="1"/>
+          </p:cNvSpPr>
+          <p:nvPr>
+            <p:ph type="title"/>
+          </p:nvPr>
+        </p:nvSpPr>
+        <p:spPr/>
+        <p:txBody>
+          <a:bodyPr/>
+          <a:lstStyle/>
+          <a:p>
+            <a:endParaRPr lang="pt-BR"/>
+          </a:p>
+        </p:txBody>
+      </p:sp>
+      <p:sp>
+        <p:nvSpPr>
+          <p:cNvPr id="3" name="Espaço Reservado para Texto 2"/>
+          <p:cNvSpPr>
+            <a:spLocks noGrp="1"/>
+          </p:cNvSpPr>
+          <p:nvPr>
+            <p:ph type="body" idx="1"/>
+          </p:nvPr>
+        </p:nvSpPr>
+        <p:spPr/>
+        <p:txBody>
+          <a:bodyPr/>
+          <a:lstStyle/>
+          <a:p>
+            <a:endParaRPr lang="pt-BR"/>
+          </a:p>
+        </p:txBody>
+      </p:sp>
+    </p:spTree>
+    <p:extLst>
+      <p:ext uri="{BB962C8B-B14F-4D97-AF65-F5344CB8AC3E}">
+        <p14:creationId xmlns:p14="http://schemas.microsoft.com/office/powerpoint/2010/main" val="3462152150"/>
+      </p:ext>
+    </p:extLst>
+  </p:cSld>
+  <p:clrMapOvr>
+    <a:masterClrMapping/>
+  </p:clrMapOvr>
+</p:sld>
+</file>
+
+<file path=ppt/slides/slide11.xml><?xml version="1.0" encoding="utf-8"?>
+<p:sld xmlns:a="http://schemas.openxmlformats.org/drawingml/2006/main" xmlns:r="http://schemas.openxmlformats.org/officeDocument/2006/relationships" xmlns:p="http://schemas.openxmlformats.org/presentationml/2006/main">
+  <p:cSld>
+    <p:spTree>
+      <p:nvGrpSpPr>
+        <p:cNvPr id="1" name=""/>
+        <p:cNvGrpSpPr/>
+        <p:nvPr/>
+      </p:nvGrpSpPr>
+      <p:grpSpPr>
+        <a:xfrm>
+          <a:off x="0" y="0"/>
+          <a:ext cx="0" cy="0"/>
+          <a:chOff x="0" y="0"/>
+          <a:chExt cx="0" cy="0"/>
+        </a:xfrm>
+      </p:grpSpPr>
+      <p:sp>
+        <p:nvSpPr>
+          <p:cNvPr id="2" name="Título 1"/>
+          <p:cNvSpPr>
+            <a:spLocks noGrp="1"/>
+          </p:cNvSpPr>
+          <p:nvPr>
+            <p:ph type="title"/>
+          </p:nvPr>
+        </p:nvSpPr>
+        <p:spPr/>
+        <p:txBody>
+          <a:bodyPr/>
+          <a:lstStyle/>
+          <a:p>
+            <a:r>
+              <a:rPr lang="en-US" dirty="0" smtClean="0"/>
+              <a:t>Step-by-step</a:t>
+            </a:r>
+            <a:endParaRPr lang="en-US" dirty="0"/>
+          </a:p>
+        </p:txBody>
+      </p:sp>
+      <p:sp>
+        <p:nvSpPr>
+          <p:cNvPr id="3" name="Espaço Reservado para Conteúdo 2"/>
+          <p:cNvSpPr>
+            <a:spLocks noGrp="1"/>
+          </p:cNvSpPr>
+          <p:nvPr>
+            <p:ph idx="1"/>
+          </p:nvPr>
+        </p:nvSpPr>
+        <p:spPr/>
+        <p:txBody>
+          <a:bodyPr>
+            <a:normAutofit fontScale="92500"/>
+          </a:bodyPr>
+          <a:lstStyle/>
+          <a:p>
+            <a:r>
+              <a:rPr lang="en-US" dirty="0" smtClean="0"/>
+              <a:t>Download zipped commit</a:t>
+            </a:r>
+          </a:p>
+          <a:p>
+            <a:r>
+              <a:rPr lang="en-US" dirty="0" smtClean="0"/>
+              <a:t>Unzip commit</a:t>
+            </a:r>
+          </a:p>
+          <a:p>
+            <a:r>
+              <a:rPr lang="en-US" dirty="0" smtClean="0"/>
+              <a:t>Load files from an directory and its subdirectories</a:t>
+            </a:r>
+          </a:p>
+          <a:p>
+            <a:r>
+              <a:rPr lang="en-US" dirty="0" smtClean="0"/>
+              <a:t>Compute differences between code assets</a:t>
+            </a:r>
+          </a:p>
+          <a:p>
+            <a:r>
+              <a:rPr lang="en-US" dirty="0" smtClean="0"/>
+              <a:t>Calculate changesets from the base commit</a:t>
+            </a:r>
+          </a:p>
+          <a:p>
+            <a:r>
+              <a:rPr lang="en-US" dirty="0" smtClean="0"/>
+              <a:t>Calculate changesets intersections between commits</a:t>
+            </a:r>
+          </a:p>
+          <a:p>
+            <a:r>
+              <a:rPr lang="en-US" dirty="0" smtClean="0"/>
+              <a:t>Show reports</a:t>
+            </a:r>
+            <a:endParaRPr lang="en-US" dirty="0"/>
+          </a:p>
+        </p:txBody>
+      </p:sp>
+      <p:pic>
+        <p:nvPicPr>
+          <p:cNvPr id="6" name="Picture 2" descr="Green Check Mark Clip Art"/>
+          <p:cNvPicPr>
+            <a:picLocks noChangeAspect="1" noChangeArrowheads="1"/>
+          </p:cNvPicPr>
+          <p:nvPr/>
+        </p:nvPicPr>
+        <p:blipFill>
+          <a:blip r:embed="rId2" cstate="print">
+            <a:extLst>
+              <a:ext uri="{28A0092B-C50C-407E-A947-70E740481C1C}">
+                <a14:useLocalDpi xmlns:a14="http://schemas.microsoft.com/office/drawing/2010/main" val="0"/>
+              </a:ext>
+            </a:extLst>
+          </a:blip>
+          <a:srcRect/>
+          <a:stretch>
+            <a:fillRect/>
+          </a:stretch>
+        </p:blipFill>
+        <p:spPr bwMode="auto">
+          <a:xfrm rot="1170216">
+            <a:off x="8637109" y="2547150"/>
+            <a:ext cx="405160" cy="466406"/>
+          </a:xfrm>
+          <a:prstGeom prst="rect">
+            <a:avLst/>
+          </a:prstGeom>
+          <a:noFill/>
+          <a:extLst>
+            <a:ext uri="{909E8E84-426E-40DD-AFC4-6F175D3DCCD1}">
+              <a14:hiddenFill xmlns:a14="http://schemas.microsoft.com/office/drawing/2010/main">
+                <a:solidFill>
+                  <a:srgbClr val="FFFFFF"/>
+                </a:solidFill>
+              </a14:hiddenFill>
+            </a:ext>
+          </a:extLst>
+        </p:spPr>
+      </p:pic>
+      <p:pic>
+        <p:nvPicPr>
+          <p:cNvPr id="7" name="Picture 2" descr="Green Check Mark Clip Art"/>
+          <p:cNvPicPr>
+            <a:picLocks noChangeAspect="1" noChangeArrowheads="1"/>
+          </p:cNvPicPr>
+          <p:nvPr/>
+        </p:nvPicPr>
+        <p:blipFill>
+          <a:blip r:embed="rId2" cstate="print">
+            <a:extLst>
+              <a:ext uri="{28A0092B-C50C-407E-A947-70E740481C1C}">
+                <a14:useLocalDpi xmlns:a14="http://schemas.microsoft.com/office/drawing/2010/main" val="0"/>
+              </a:ext>
+            </a:extLst>
+          </a:blip>
+          <a:srcRect/>
+          <a:stretch>
+            <a:fillRect/>
+          </a:stretch>
+        </p:blipFill>
+        <p:spPr bwMode="auto">
+          <a:xfrm rot="1170216">
+            <a:off x="3270083" y="2115102"/>
+            <a:ext cx="405160" cy="466406"/>
+          </a:xfrm>
+          <a:prstGeom prst="rect">
+            <a:avLst/>
+          </a:prstGeom>
+          <a:noFill/>
+          <a:extLst>
+            <a:ext uri="{909E8E84-426E-40DD-AFC4-6F175D3DCCD1}">
+              <a14:hiddenFill xmlns:a14="http://schemas.microsoft.com/office/drawing/2010/main">
+                <a:solidFill>
+                  <a:srgbClr val="FFFFFF"/>
+                </a:solidFill>
+              </a14:hiddenFill>
+            </a:ext>
+          </a:extLst>
+        </p:spPr>
+      </p:pic>
+      <p:pic>
+        <p:nvPicPr>
+          <p:cNvPr id="8" name="Picture 2" descr="Green Check Mark Clip Art"/>
+          <p:cNvPicPr>
+            <a:picLocks noChangeAspect="1" noChangeArrowheads="1"/>
+          </p:cNvPicPr>
+          <p:nvPr/>
+        </p:nvPicPr>
+        <p:blipFill>
+          <a:blip r:embed="rId2" cstate="print">
+            <a:extLst>
+              <a:ext uri="{28A0092B-C50C-407E-A947-70E740481C1C}">
+                <a14:useLocalDpi xmlns:a14="http://schemas.microsoft.com/office/drawing/2010/main" val="0"/>
+              </a:ext>
+            </a:extLst>
+          </a:blip>
+          <a:srcRect/>
+          <a:stretch>
+            <a:fillRect/>
+          </a:stretch>
+        </p:blipFill>
+        <p:spPr bwMode="auto">
+          <a:xfrm rot="1170216">
+            <a:off x="4998275" y="1540188"/>
+            <a:ext cx="405160" cy="466406"/>
+          </a:xfrm>
+          <a:prstGeom prst="rect">
+            <a:avLst/>
+          </a:prstGeom>
+          <a:noFill/>
+          <a:extLst>
+            <a:ext uri="{909E8E84-426E-40DD-AFC4-6F175D3DCCD1}">
+              <a14:hiddenFill xmlns:a14="http://schemas.microsoft.com/office/drawing/2010/main">
+                <a:solidFill>
+                  <a:srgbClr val="FFFFFF"/>
+                </a:solidFill>
+              </a14:hiddenFill>
+            </a:ext>
+          </a:extLst>
+        </p:spPr>
+      </p:pic>
+      <p:pic>
+        <p:nvPicPr>
+          <p:cNvPr id="9" name="Picture 2" descr="Green Check Mark Clip Art"/>
+          <p:cNvPicPr>
+            <a:picLocks noChangeAspect="1" noChangeArrowheads="1"/>
+          </p:cNvPicPr>
+          <p:nvPr/>
+        </p:nvPicPr>
+        <p:blipFill>
+          <a:blip r:embed="rId2" cstate="print">
+            <a:extLst>
+              <a:ext uri="{28A0092B-C50C-407E-A947-70E740481C1C}">
+                <a14:useLocalDpi xmlns:a14="http://schemas.microsoft.com/office/drawing/2010/main" val="0"/>
+              </a:ext>
+            </a:extLst>
+          </a:blip>
+          <a:srcRect/>
+          <a:stretch>
+            <a:fillRect/>
+          </a:stretch>
+        </p:blipFill>
+        <p:spPr bwMode="auto">
+          <a:xfrm rot="1170216">
+            <a:off x="7556989" y="3196372"/>
+            <a:ext cx="405160" cy="466406"/>
+          </a:xfrm>
+          <a:prstGeom prst="rect">
+            <a:avLst/>
+          </a:prstGeom>
+          <a:noFill/>
+          <a:extLst>
+            <a:ext uri="{909E8E84-426E-40DD-AFC4-6F175D3DCCD1}">
+              <a14:hiddenFill xmlns:a14="http://schemas.microsoft.com/office/drawing/2010/main">
+                <a:solidFill>
+                  <a:srgbClr val="FFFFFF"/>
+                </a:solidFill>
+              </a14:hiddenFill>
+            </a:ext>
+          </a:extLst>
+        </p:spPr>
+      </p:pic>
+      <p:pic>
+        <p:nvPicPr>
+          <p:cNvPr id="10" name="Picture 2" descr="Green Check Mark Clip Art"/>
+          <p:cNvPicPr>
+            <a:picLocks noChangeAspect="1" noChangeArrowheads="1"/>
+          </p:cNvPicPr>
+          <p:nvPr/>
+        </p:nvPicPr>
+        <p:blipFill>
+          <a:blip r:embed="rId2" cstate="print">
+            <a:extLst>
+              <a:ext uri="{28A0092B-C50C-407E-A947-70E740481C1C}">
+                <a14:useLocalDpi xmlns:a14="http://schemas.microsoft.com/office/drawing/2010/main" val="0"/>
+              </a:ext>
+            </a:extLst>
+          </a:blip>
+          <a:srcRect/>
+          <a:stretch>
+            <a:fillRect/>
+          </a:stretch>
+        </p:blipFill>
+        <p:spPr bwMode="auto">
+          <a:xfrm rot="1170216">
+            <a:off x="7701475" y="3771286"/>
+            <a:ext cx="405160" cy="466406"/>
+          </a:xfrm>
+          <a:prstGeom prst="rect">
+            <a:avLst/>
+          </a:prstGeom>
+          <a:noFill/>
+          <a:extLst>
+            <a:ext uri="{909E8E84-426E-40DD-AFC4-6F175D3DCCD1}">
+              <a14:hiddenFill xmlns:a14="http://schemas.microsoft.com/office/drawing/2010/main">
+                <a:solidFill>
+                  <a:srgbClr val="FFFFFF"/>
+                </a:solidFill>
+              </a14:hiddenFill>
+            </a:ext>
+          </a:extLst>
+        </p:spPr>
+      </p:pic>
+    </p:spTree>
+    <p:extLst>
+      <p:ext uri="{BB962C8B-B14F-4D97-AF65-F5344CB8AC3E}">
+        <p14:creationId xmlns:p14="http://schemas.microsoft.com/office/powerpoint/2010/main" val="1403852349"/>
+      </p:ext>
+    </p:extLst>
+  </p:cSld>
+  <p:clrMapOvr>
+    <a:masterClrMapping/>
+  </p:clrMapOvr>
+</p:sld>
+</file>
+
+<file path=ppt/slides/slide12.xml><?xml version="1.0" encoding="utf-8"?>
 <p:sld xmlns:a="http://schemas.openxmlformats.org/drawingml/2006/main" xmlns:r="http://schemas.openxmlformats.org/officeDocument/2006/relationships" xmlns:p="http://schemas.openxmlformats.org/presentationml/2006/main">
   <p:cSld>
     <p:spTree>
@@ -7915,7 +8304,7 @@
       </p:grpSpPr>
       <p:sp>
         <p:nvSpPr>
-          <p:cNvPr id="2" name="Título 1"/>
+          <p:cNvPr id="4" name="Título 3"/>
           <p:cNvSpPr>
             <a:spLocks noGrp="1"/>
           </p:cNvSpPr>
@@ -7929,242 +8318,76 @@
           <a:lstStyle/>
           <a:p>
             <a:r>
-              <a:rPr lang="en-US" dirty="0" smtClean="0"/>
-              <a:t>Step-by-step</a:t>
-            </a:r>
-            <a:endParaRPr lang="en-US" dirty="0"/>
-          </a:p>
-        </p:txBody>
-      </p:sp>
-      <p:sp>
-        <p:nvSpPr>
-          <p:cNvPr id="3" name="Espaço Reservado para Conteúdo 2"/>
+              <a:rPr lang="pt-BR" dirty="0" err="1" smtClean="0"/>
+              <a:t>Algorithm</a:t>
+            </a:r>
+            <a:r>
+              <a:rPr lang="pt-BR" dirty="0" smtClean="0"/>
+              <a:t> </a:t>
+            </a:r>
+            <a:r>
+              <a:rPr lang="pt-BR" dirty="0" err="1" smtClean="0"/>
+              <a:t>that</a:t>
+            </a:r>
+            <a:r>
+              <a:rPr lang="pt-BR" dirty="0" smtClean="0"/>
+              <a:t> computes </a:t>
+            </a:r>
+            <a:r>
+              <a:rPr lang="pt-BR" dirty="0" err="1" smtClean="0"/>
+              <a:t>the</a:t>
+            </a:r>
+            <a:r>
+              <a:rPr lang="pt-BR" dirty="0" smtClean="0"/>
+              <a:t> </a:t>
+            </a:r>
+            <a:r>
+              <a:rPr lang="pt-BR" dirty="0" err="1" smtClean="0"/>
+              <a:t>changeset</a:t>
+            </a:r>
+            <a:r>
+              <a:rPr lang="pt-BR" dirty="0" smtClean="0"/>
+              <a:t> </a:t>
+            </a:r>
+            <a:r>
+              <a:rPr lang="pt-BR" dirty="0" err="1" smtClean="0"/>
+              <a:t>from</a:t>
+            </a:r>
+            <a:r>
+              <a:rPr lang="pt-BR" dirty="0" smtClean="0"/>
+              <a:t> a base </a:t>
+            </a:r>
+            <a:r>
+              <a:rPr lang="pt-BR" dirty="0" err="1" smtClean="0"/>
+              <a:t>commit</a:t>
+            </a:r>
+            <a:endParaRPr lang="pt-BR" dirty="0"/>
+          </a:p>
+        </p:txBody>
+      </p:sp>
+      <p:sp>
+        <p:nvSpPr>
+          <p:cNvPr id="5" name="Espaço Reservado para Texto 4"/>
           <p:cNvSpPr>
             <a:spLocks noGrp="1"/>
           </p:cNvSpPr>
           <p:nvPr>
-            <p:ph idx="1"/>
+            <p:ph type="body" idx="1"/>
           </p:nvPr>
         </p:nvSpPr>
         <p:spPr/>
         <p:txBody>
-          <a:bodyPr>
-            <a:normAutofit fontScale="92500"/>
-          </a:bodyPr>
-          <a:lstStyle/>
-          <a:p>
-            <a:r>
-              <a:rPr lang="en-US" dirty="0" smtClean="0"/>
-              <a:t>Download zipped commit</a:t>
-            </a:r>
-          </a:p>
-          <a:p>
-            <a:r>
-              <a:rPr lang="en-US" dirty="0" smtClean="0"/>
-              <a:t>Unzip commit</a:t>
-            </a:r>
-          </a:p>
-          <a:p>
-            <a:r>
-              <a:rPr lang="en-US" dirty="0" smtClean="0"/>
-              <a:t>Load files from an directory and its subdirectories</a:t>
-            </a:r>
-          </a:p>
-          <a:p>
-            <a:r>
-              <a:rPr lang="en-US" dirty="0" smtClean="0"/>
-              <a:t>Compute differences between code assets</a:t>
-            </a:r>
-          </a:p>
-          <a:p>
-            <a:r>
-              <a:rPr lang="en-US" dirty="0" smtClean="0"/>
-              <a:t>Calculate changesets from the base commit</a:t>
-            </a:r>
-          </a:p>
-          <a:p>
-            <a:r>
-              <a:rPr lang="en-US" dirty="0" smtClean="0"/>
-              <a:t>Calculate changesets intersections between commits</a:t>
-            </a:r>
-          </a:p>
-          <a:p>
-            <a:r>
-              <a:rPr lang="en-US" dirty="0" smtClean="0"/>
-              <a:t>Show reports</a:t>
-            </a:r>
-            <a:endParaRPr lang="en-US" dirty="0"/>
-          </a:p>
-        </p:txBody>
-      </p:sp>
-      <p:pic>
-        <p:nvPicPr>
-          <p:cNvPr id="6" name="Picture 2" descr="Green Check Mark Clip Art"/>
-          <p:cNvPicPr>
-            <a:picLocks noChangeAspect="1" noChangeArrowheads="1"/>
-          </p:cNvPicPr>
-          <p:nvPr/>
-        </p:nvPicPr>
-        <p:blipFill>
-          <a:blip r:embed="rId2" cstate="print">
-            <a:extLst>
-              <a:ext uri="{28A0092B-C50C-407E-A947-70E740481C1C}">
-                <a14:useLocalDpi xmlns:a14="http://schemas.microsoft.com/office/drawing/2010/main" val="0"/>
-              </a:ext>
-            </a:extLst>
-          </a:blip>
-          <a:srcRect/>
-          <a:stretch>
-            <a:fillRect/>
-          </a:stretch>
-        </p:blipFill>
-        <p:spPr bwMode="auto">
-          <a:xfrm rot="1170216">
-            <a:off x="8637109" y="2547150"/>
-            <a:ext cx="405160" cy="466406"/>
-          </a:xfrm>
-          <a:prstGeom prst="rect">
-            <a:avLst/>
-          </a:prstGeom>
-          <a:noFill/>
-          <a:extLst>
-            <a:ext uri="{909E8E84-426E-40DD-AFC4-6F175D3DCCD1}">
-              <a14:hiddenFill xmlns:a14="http://schemas.microsoft.com/office/drawing/2010/main">
-                <a:solidFill>
-                  <a:srgbClr val="FFFFFF"/>
-                </a:solidFill>
-              </a14:hiddenFill>
-            </a:ext>
-          </a:extLst>
-        </p:spPr>
-      </p:pic>
-      <p:pic>
-        <p:nvPicPr>
-          <p:cNvPr id="7" name="Picture 2" descr="Green Check Mark Clip Art"/>
-          <p:cNvPicPr>
-            <a:picLocks noChangeAspect="1" noChangeArrowheads="1"/>
-          </p:cNvPicPr>
-          <p:nvPr/>
-        </p:nvPicPr>
-        <p:blipFill>
-          <a:blip r:embed="rId2" cstate="print">
-            <a:extLst>
-              <a:ext uri="{28A0092B-C50C-407E-A947-70E740481C1C}">
-                <a14:useLocalDpi xmlns:a14="http://schemas.microsoft.com/office/drawing/2010/main" val="0"/>
-              </a:ext>
-            </a:extLst>
-          </a:blip>
-          <a:srcRect/>
-          <a:stretch>
-            <a:fillRect/>
-          </a:stretch>
-        </p:blipFill>
-        <p:spPr bwMode="auto">
-          <a:xfrm rot="1170216">
-            <a:off x="3270083" y="2115102"/>
-            <a:ext cx="405160" cy="466406"/>
-          </a:xfrm>
-          <a:prstGeom prst="rect">
-            <a:avLst/>
-          </a:prstGeom>
-          <a:noFill/>
-          <a:extLst>
-            <a:ext uri="{909E8E84-426E-40DD-AFC4-6F175D3DCCD1}">
-              <a14:hiddenFill xmlns:a14="http://schemas.microsoft.com/office/drawing/2010/main">
-                <a:solidFill>
-                  <a:srgbClr val="FFFFFF"/>
-                </a:solidFill>
-              </a14:hiddenFill>
-            </a:ext>
-          </a:extLst>
-        </p:spPr>
-      </p:pic>
-      <p:pic>
-        <p:nvPicPr>
-          <p:cNvPr id="8" name="Picture 2" descr="Green Check Mark Clip Art"/>
-          <p:cNvPicPr>
-            <a:picLocks noChangeAspect="1" noChangeArrowheads="1"/>
-          </p:cNvPicPr>
-          <p:nvPr/>
-        </p:nvPicPr>
-        <p:blipFill>
-          <a:blip r:embed="rId2" cstate="print">
-            <a:extLst>
-              <a:ext uri="{28A0092B-C50C-407E-A947-70E740481C1C}">
-                <a14:useLocalDpi xmlns:a14="http://schemas.microsoft.com/office/drawing/2010/main" val="0"/>
-              </a:ext>
-            </a:extLst>
-          </a:blip>
-          <a:srcRect/>
-          <a:stretch>
-            <a:fillRect/>
-          </a:stretch>
-        </p:blipFill>
-        <p:spPr bwMode="auto">
-          <a:xfrm rot="1170216">
-            <a:off x="4998275" y="1540188"/>
-            <a:ext cx="405160" cy="466406"/>
-          </a:xfrm>
-          <a:prstGeom prst="rect">
-            <a:avLst/>
-          </a:prstGeom>
-          <a:noFill/>
-          <a:extLst>
-            <a:ext uri="{909E8E84-426E-40DD-AFC4-6F175D3DCCD1}">
-              <a14:hiddenFill xmlns:a14="http://schemas.microsoft.com/office/drawing/2010/main">
-                <a:solidFill>
-                  <a:srgbClr val="FFFFFF"/>
-                </a:solidFill>
-              </a14:hiddenFill>
-            </a:ext>
-          </a:extLst>
-        </p:spPr>
-      </p:pic>
-      <p:pic>
-        <p:nvPicPr>
-          <p:cNvPr id="9" name="Picture 2" descr="Green Check Mark Clip Art"/>
-          <p:cNvPicPr>
-            <a:picLocks noChangeAspect="1" noChangeArrowheads="1"/>
-          </p:cNvPicPr>
-          <p:nvPr/>
-        </p:nvPicPr>
-        <p:blipFill>
-          <a:blip r:embed="rId2" cstate="print">
-            <a:extLst>
-              <a:ext uri="{28A0092B-C50C-407E-A947-70E740481C1C}">
-                <a14:useLocalDpi xmlns:a14="http://schemas.microsoft.com/office/drawing/2010/main" val="0"/>
-              </a:ext>
-            </a:extLst>
-          </a:blip>
-          <a:srcRect/>
-          <a:stretch>
-            <a:fillRect/>
-          </a:stretch>
-        </p:blipFill>
-        <p:spPr bwMode="auto">
-          <a:xfrm rot="1170216">
-            <a:off x="7556989" y="3196372"/>
-            <a:ext cx="405160" cy="466406"/>
-          </a:xfrm>
-          <a:prstGeom prst="rect">
-            <a:avLst/>
-          </a:prstGeom>
-          <a:noFill/>
-          <a:extLst>
-            <a:ext uri="{909E8E84-426E-40DD-AFC4-6F175D3DCCD1}">
-              <a14:hiddenFill xmlns:a14="http://schemas.microsoft.com/office/drawing/2010/main">
-                <a:solidFill>
-                  <a:srgbClr val="FFFFFF"/>
-                </a:solidFill>
-              </a14:hiddenFill>
-            </a:ext>
-          </a:extLst>
-        </p:spPr>
-      </p:pic>
+          <a:bodyPr/>
+          <a:lstStyle/>
+          <a:p>
+            <a:endParaRPr lang="pt-BR"/>
+          </a:p>
+        </p:txBody>
+      </p:sp>
     </p:spTree>
     <p:extLst>
       <p:ext uri="{BB962C8B-B14F-4D97-AF65-F5344CB8AC3E}">
-        <p14:creationId xmlns:p14="http://schemas.microsoft.com/office/powerpoint/2010/main" val="1403852349"/>
+        <p14:creationId xmlns:p14="http://schemas.microsoft.com/office/powerpoint/2010/main" val="3635147579"/>
       </p:ext>
     </p:extLst>
   </p:cSld>

</xml_diff>